<commit_message>
Stats decay when game is offline.
</commit_message>
<xml_diff>
--- a/Tamagotchi Buddy.pptx
+++ b/Tamagotchi Buddy.pptx
@@ -5655,13 +5655,8 @@
           <a:p>
             <a:r>
               <a:rPr lang="en-US" dirty="0" smtClean="0"/>
-              <a:t>Gabriela </a:t>
-            </a:r>
-            <a:r>
-              <a:rPr lang="en-US" dirty="0" smtClean="0"/>
-              <a:t>Geneva</a:t>
-            </a:r>
-            <a:endParaRPr lang="en-US" dirty="0" smtClean="0"/>
+              <a:t>Gabriela Geneva</a:t>
+            </a:r>
           </a:p>
         </p:txBody>
       </p:sp>
@@ -5914,31 +5909,40 @@
             </a:r>
             <a:r>
               <a:rPr lang="en-US" dirty="0" smtClean="0"/>
-              <a:t>game core, architecture</a:t>
-            </a:r>
-          </a:p>
-          <a:p>
+              <a:t>game core, </a:t>
+            </a:r>
             <a:r>
               <a:rPr lang="en-US" dirty="0" smtClean="0"/>
-              <a:t>Slav – Match </a:t>
-            </a:r>
+              <a:t>architecture, pet attributes decay</a:t>
+            </a:r>
+            <a:endParaRPr lang="en-US" dirty="0" smtClean="0"/>
+          </a:p>
+          <a:p>
             <a:r>
               <a:rPr lang="en-US" dirty="0" smtClean="0"/>
-              <a:t>Two</a:t>
+              <a:t>Slav – Match Two, save/load</a:t>
+            </a:r>
+            <a:r>
+              <a:rPr lang="en-US" smtClean="0"/>
+              <a:t>, </a:t>
+            </a:r>
+            <a:r>
+              <a:rPr lang="en-US" smtClean="0"/>
+              <a:t>pet attributes </a:t>
             </a:r>
             <a:r>
               <a:rPr lang="en-US" dirty="0" smtClean="0"/>
-              <a:t>, save/load, happiness decays over time    </a:t>
+              <a:t>decay </a:t>
             </a:r>
           </a:p>
           <a:p>
             <a:r>
               <a:rPr lang="en-US" dirty="0" smtClean="0"/>
-              <a:t>David – Ballgame, Tic </a:t>
+              <a:t>David </a:t>
             </a:r>
             <a:r>
               <a:rPr lang="en-US" dirty="0" smtClean="0"/>
-              <a:t>Tac </a:t>
+              <a:t>– Ballgame, Tic Tac </a:t>
             </a:r>
             <a:r>
               <a:rPr lang="en-US" dirty="0"/>
@@ -5948,7 +5952,6 @@
               <a:rPr lang="en-US" dirty="0" smtClean="0"/>
               <a:t>oe</a:t>
             </a:r>
-            <a:endParaRPr lang="en-US" dirty="0" smtClean="0"/>
           </a:p>
         </p:txBody>
       </p:sp>

</xml_diff>